<commit_message>
too much work: added API Resources suuport for object iwth same name in different ns contenexternal keys running arranged back addObject for magnify (now not needed) added actions from ContentDetails added Validationsadded local icons
</commit_message>
<xml_diff>
--- a/electron/splash.pptx
+++ b/electron/splash.pptx
@@ -104,6 +104,11 @@
       </a:defRPr>
     </a:lvl9pPr>
   </p:defaultTextStyle>
+  <p:extLst>
+    <p:ext uri="{EFAFB233-063F-42B5-8137-9DF3F51BA10A}">
+      <p15:sldGuideLst xmlns:p15="http://schemas.microsoft.com/office/powerpoint/2012/main"/>
+    </p:ext>
+  </p:extLst>
 </p:presentation>
 </file>
 
@@ -256,7 +261,7 @@
           <a:p>
             <a:fld id="{E3594EF9-6496-4BCC-8607-B39DB1D0A02C}" type="datetimeFigureOut">
               <a:rPr lang="es-ES" smtClean="0"/>
-              <a:t>06/02/2026</a:t>
+              <a:t>07/02/2026</a:t>
             </a:fld>
             <a:endParaRPr lang="es-ES"/>
           </a:p>
@@ -456,7 +461,7 @@
           <a:p>
             <a:fld id="{E3594EF9-6496-4BCC-8607-B39DB1D0A02C}" type="datetimeFigureOut">
               <a:rPr lang="es-ES" smtClean="0"/>
-              <a:t>06/02/2026</a:t>
+              <a:t>07/02/2026</a:t>
             </a:fld>
             <a:endParaRPr lang="es-ES"/>
           </a:p>
@@ -666,7 +671,7 @@
           <a:p>
             <a:fld id="{E3594EF9-6496-4BCC-8607-B39DB1D0A02C}" type="datetimeFigureOut">
               <a:rPr lang="es-ES" smtClean="0"/>
-              <a:t>06/02/2026</a:t>
+              <a:t>07/02/2026</a:t>
             </a:fld>
             <a:endParaRPr lang="es-ES"/>
           </a:p>
@@ -866,7 +871,7 @@
           <a:p>
             <a:fld id="{E3594EF9-6496-4BCC-8607-B39DB1D0A02C}" type="datetimeFigureOut">
               <a:rPr lang="es-ES" smtClean="0"/>
-              <a:t>06/02/2026</a:t>
+              <a:t>07/02/2026</a:t>
             </a:fld>
             <a:endParaRPr lang="es-ES"/>
           </a:p>
@@ -1142,7 +1147,7 @@
           <a:p>
             <a:fld id="{E3594EF9-6496-4BCC-8607-B39DB1D0A02C}" type="datetimeFigureOut">
               <a:rPr lang="es-ES" smtClean="0"/>
-              <a:t>06/02/2026</a:t>
+              <a:t>07/02/2026</a:t>
             </a:fld>
             <a:endParaRPr lang="es-ES"/>
           </a:p>
@@ -1410,7 +1415,7 @@
           <a:p>
             <a:fld id="{E3594EF9-6496-4BCC-8607-B39DB1D0A02C}" type="datetimeFigureOut">
               <a:rPr lang="es-ES" smtClean="0"/>
-              <a:t>06/02/2026</a:t>
+              <a:t>07/02/2026</a:t>
             </a:fld>
             <a:endParaRPr lang="es-ES"/>
           </a:p>
@@ -1825,7 +1830,7 @@
           <a:p>
             <a:fld id="{E3594EF9-6496-4BCC-8607-B39DB1D0A02C}" type="datetimeFigureOut">
               <a:rPr lang="es-ES" smtClean="0"/>
-              <a:t>06/02/2026</a:t>
+              <a:t>07/02/2026</a:t>
             </a:fld>
             <a:endParaRPr lang="es-ES"/>
           </a:p>
@@ -1967,7 +1972,7 @@
           <a:p>
             <a:fld id="{E3594EF9-6496-4BCC-8607-B39DB1D0A02C}" type="datetimeFigureOut">
               <a:rPr lang="es-ES" smtClean="0"/>
-              <a:t>06/02/2026</a:t>
+              <a:t>07/02/2026</a:t>
             </a:fld>
             <a:endParaRPr lang="es-ES"/>
           </a:p>
@@ -2080,7 +2085,7 @@
           <a:p>
             <a:fld id="{E3594EF9-6496-4BCC-8607-B39DB1D0A02C}" type="datetimeFigureOut">
               <a:rPr lang="es-ES" smtClean="0"/>
-              <a:t>06/02/2026</a:t>
+              <a:t>07/02/2026</a:t>
             </a:fld>
             <a:endParaRPr lang="es-ES"/>
           </a:p>
@@ -2393,7 +2398,7 @@
           <a:p>
             <a:fld id="{E3594EF9-6496-4BCC-8607-B39DB1D0A02C}" type="datetimeFigureOut">
               <a:rPr lang="es-ES" smtClean="0"/>
-              <a:t>06/02/2026</a:t>
+              <a:t>07/02/2026</a:t>
             </a:fld>
             <a:endParaRPr lang="es-ES"/>
           </a:p>
@@ -2682,7 +2687,7 @@
           <a:p>
             <a:fld id="{E3594EF9-6496-4BCC-8607-B39DB1D0A02C}" type="datetimeFigureOut">
               <a:rPr lang="es-ES" smtClean="0"/>
-              <a:t>06/02/2026</a:t>
+              <a:t>07/02/2026</a:t>
             </a:fld>
             <a:endParaRPr lang="es-ES"/>
           </a:p>
@@ -2925,7 +2930,7 @@
           <a:p>
             <a:fld id="{E3594EF9-6496-4BCC-8607-B39DB1D0A02C}" type="datetimeFigureOut">
               <a:rPr lang="es-ES" smtClean="0"/>
-              <a:t>06/02/2026</a:t>
+              <a:t>07/02/2026</a:t>
             </a:fld>
             <a:endParaRPr lang="es-ES"/>
           </a:p>
@@ -3493,8 +3498,8 @@
         </p:nvSpPr>
         <p:spPr>
           <a:xfrm>
-            <a:off x="7727055" y="804671"/>
-            <a:ext cx="1563248" cy="1200329"/>
+            <a:off x="6854883" y="1058588"/>
+            <a:ext cx="2252540" cy="646331"/>
           </a:xfrm>
           <a:prstGeom prst="rect">
             <a:avLst/>
@@ -3509,50 +3514,22 @@
           <a:p>
             <a:pPr algn="r"/>
             <a:r>
-              <a:rPr lang="es-ES" dirty="0">
+              <a:rPr lang="en-US" noProof="0" dirty="0">
                 <a:latin typeface="Courier New" panose="02070309020205020404" pitchFamily="49" charset="0"/>
                 <a:cs typeface="Courier New" panose="02070309020205020404" pitchFamily="49" charset="0"/>
               </a:rPr>
-              <a:t>Your</a:t>
+              <a:t>Your Kubernetes</a:t>
             </a:r>
           </a:p>
           <a:p>
             <a:pPr algn="r"/>
             <a:r>
-              <a:rPr lang="es-ES" dirty="0">
+              <a:rPr lang="en-US" noProof="0" dirty="0">
                 <a:latin typeface="Courier New" panose="02070309020205020404" pitchFamily="49" charset="0"/>
                 <a:cs typeface="Courier New" panose="02070309020205020404" pitchFamily="49" charset="0"/>
               </a:rPr>
-              <a:t>Kubernetes</a:t>
-            </a:r>
-          </a:p>
-          <a:p>
-            <a:pPr algn="r"/>
-            <a:r>
-              <a:rPr lang="es-ES" dirty="0" err="1">
-                <a:latin typeface="Courier New" panose="02070309020205020404" pitchFamily="49" charset="0"/>
-                <a:cs typeface="Courier New" panose="02070309020205020404" pitchFamily="49" charset="0"/>
-              </a:rPr>
-              <a:t>Friendly</a:t>
-            </a:r>
-            <a:endParaRPr lang="es-ES" dirty="0">
-              <a:latin typeface="Courier New" panose="02070309020205020404" pitchFamily="49" charset="0"/>
-              <a:cs typeface="Courier New" panose="02070309020205020404" pitchFamily="49" charset="0"/>
-            </a:endParaRPr>
-          </a:p>
-          <a:p>
-            <a:pPr algn="r"/>
-            <a:r>
-              <a:rPr lang="es-ES" dirty="0" err="1">
-                <a:latin typeface="Courier New" panose="02070309020205020404" pitchFamily="49" charset="0"/>
-                <a:cs typeface="Courier New" panose="02070309020205020404" pitchFamily="49" charset="0"/>
-              </a:rPr>
-              <a:t>tool</a:t>
-            </a:r>
-            <a:endParaRPr lang="es-ES" dirty="0">
-              <a:latin typeface="Courier New" panose="02070309020205020404" pitchFamily="49" charset="0"/>
-              <a:cs typeface="Courier New" panose="02070309020205020404" pitchFamily="49" charset="0"/>
-            </a:endParaRPr>
+              <a:t>Friendly tool</a:t>
+            </a:r>
           </a:p>
         </p:txBody>
       </p:sp>

</xml_diff>